<commit_message>
Readme and PPT updates
</commit_message>
<xml_diff>
--- a/Project1.pptx
+++ b/Project1.pptx
@@ -3646,7 +3646,7 @@
               <a:ea typeface="+mn-ea"/>
               <a:cs typeface="+mn-cs"/>
             </a:rPr>
-            <a:t>(meeting virtually and merging codes)</a:t>
+            <a:t>(meeting virtually; merging codes)</a:t>
           </a:r>
         </a:p>
       </dgm:t>
@@ -3738,7 +3738,7 @@
               <a:ea typeface="+mn-ea"/>
               <a:cs typeface="+mn-cs"/>
             </a:rPr>
-            <a:t>(Knowing each other’s strengths and completing the project by our internal deadline)</a:t>
+            <a:t>(Knowing each other’s strengths; completing the project by our internal deadline; personal growth)</a:t>
           </a:r>
         </a:p>
         <a:p>
@@ -3795,7 +3795,7 @@
       <dgm:spPr/>
     </dgm:pt>
     <dgm:pt modelId="{D1EB1558-3083-458C-A986-611311E991AD}" type="pres">
-      <dgm:prSet presAssocID="{46D0AC4B-295F-4AF5-B93F-37C176E117F7}" presName="iconBgRect" presStyleLbl="bgShp" presStyleIdx="0" presStyleCnt="3"/>
+      <dgm:prSet presAssocID="{46D0AC4B-295F-4AF5-B93F-37C176E117F7}" presName="iconBgRect" presStyleLbl="bgShp" presStyleIdx="0" presStyleCnt="3" custScaleY="104140" custLinFactX="-19687" custLinFactNeighborX="-100000" custLinFactNeighborY="965"/>
       <dgm:spPr>
         <a:prstGeom prst="round2DiagRect">
           <a:avLst>
@@ -3816,7 +3816,7 @@
       </dgm:spPr>
     </dgm:pt>
     <dgm:pt modelId="{65BEB2AE-CF4F-4FDE-85AE-990B0504A4E9}" type="pres">
-      <dgm:prSet presAssocID="{46D0AC4B-295F-4AF5-B93F-37C176E117F7}" presName="iconRect" presStyleLbl="node1" presStyleIdx="0" presStyleCnt="3"/>
+      <dgm:prSet presAssocID="{46D0AC4B-295F-4AF5-B93F-37C176E117F7}" presName="iconRect" presStyleLbl="node1" presStyleIdx="0" presStyleCnt="3" custScaleY="104140" custLinFactX="-100000" custLinFactNeighborX="-108598" custLinFactNeighborY="1682"/>
       <dgm:spPr>
         <a:blipFill>
           <a:blip xmlns:r="http://schemas.openxmlformats.org/officeDocument/2006/relationships" r:embed="rId1">
@@ -3848,7 +3848,7 @@
       <dgm:spPr/>
     </dgm:pt>
     <dgm:pt modelId="{0CF39296-C7BF-44FE-A6A8-F2B950CFC883}" type="pres">
-      <dgm:prSet presAssocID="{46D0AC4B-295F-4AF5-B93F-37C176E117F7}" presName="textRect" presStyleLbl="revTx" presStyleIdx="0" presStyleCnt="3">
+      <dgm:prSet presAssocID="{46D0AC4B-295F-4AF5-B93F-37C176E117F7}" presName="textRect" presStyleLbl="revTx" presStyleIdx="0" presStyleCnt="3" custScaleY="102705" custLinFactNeighborX="-73009" custLinFactNeighborY="79">
         <dgm:presLayoutVars>
           <dgm:chMax val="1"/>
           <dgm:chPref val="1"/>
@@ -3935,7 +3935,7 @@
       <dgm:spPr/>
     </dgm:pt>
     <dgm:pt modelId="{26D84C9B-2A6D-497C-80A3-27B8C3430717}" type="pres">
-      <dgm:prSet presAssocID="{18A391EC-6BC7-4592-9140-6F88E9C47EB0}" presName="iconBgRect" presStyleLbl="bgShp" presStyleIdx="2" presStyleCnt="3"/>
+      <dgm:prSet presAssocID="{18A391EC-6BC7-4592-9140-6F88E9C47EB0}" presName="iconBgRect" presStyleLbl="bgShp" presStyleIdx="2" presStyleCnt="3" custLinFactX="37062" custLinFactNeighborX="100000" custLinFactNeighborY="1715"/>
       <dgm:spPr>
         <a:prstGeom prst="round2DiagRect">
           <a:avLst>
@@ -3956,7 +3956,7 @@
       </dgm:spPr>
     </dgm:pt>
     <dgm:pt modelId="{541E976F-FE18-4161-82AF-4B8DDA3B5B24}" type="pres">
-      <dgm:prSet presAssocID="{18A391EC-6BC7-4592-9140-6F88E9C47EB0}" presName="iconRect" presStyleLbl="node1" presStyleIdx="2" presStyleCnt="3"/>
+      <dgm:prSet presAssocID="{18A391EC-6BC7-4592-9140-6F88E9C47EB0}" presName="iconRect" presStyleLbl="node1" presStyleIdx="2" presStyleCnt="3" custLinFactX="100000" custLinFactNeighborX="140561" custLinFactNeighborY="228"/>
       <dgm:spPr>
         <a:blipFill>
           <a:blip xmlns:r="http://schemas.openxmlformats.org/officeDocument/2006/relationships" r:embed="rId5">
@@ -3988,7 +3988,7 @@
       <dgm:spPr/>
     </dgm:pt>
     <dgm:pt modelId="{2D5FDAFA-23FF-4F09-95E8-1A38563C8C1E}" type="pres">
-      <dgm:prSet presAssocID="{18A391EC-6BC7-4592-9140-6F88E9C47EB0}" presName="textRect" presStyleLbl="revTx" presStyleIdx="2" presStyleCnt="3">
+      <dgm:prSet presAssocID="{18A391EC-6BC7-4592-9140-6F88E9C47EB0}" presName="textRect" presStyleLbl="revTx" presStyleIdx="2" presStyleCnt="3" custLinFactNeighborX="83608" custLinFactNeighborY="-1401">
         <dgm:presLayoutVars>
           <dgm:chMax val="1"/>
           <dgm:chPref val="1"/>
@@ -4921,8 +4921,8 @@
       </dsp:nvSpPr>
       <dsp:spPr>
         <a:xfrm>
-          <a:off x="1541401" y="9069"/>
-          <a:ext cx="1681312" cy="1681312"/>
+          <a:off x="2007671" y="11221"/>
+          <a:ext cx="997207" cy="1038491"/>
         </a:xfrm>
         <a:prstGeom prst="round2DiagRect">
           <a:avLst>
@@ -4964,8 +4964,8 @@
       </dsp:nvSpPr>
       <dsp:spPr>
         <a:xfrm>
-          <a:off x="1899714" y="367382"/>
-          <a:ext cx="964687" cy="964687"/>
+          <a:off x="2220187" y="232539"/>
+          <a:ext cx="572167" cy="595855"/>
         </a:xfrm>
         <a:prstGeom prst="rect">
           <a:avLst/>
@@ -5014,8 +5014,8 @@
       </dsp:nvSpPr>
       <dsp:spPr>
         <a:xfrm>
-          <a:off x="1003933" y="2214069"/>
-          <a:ext cx="2756250" cy="1893567"/>
+          <a:off x="1688893" y="1294485"/>
+          <a:ext cx="1634765" cy="2822221"/>
         </a:xfrm>
         <a:prstGeom prst="rect">
           <a:avLst/>
@@ -5110,8 +5110,8 @@
         </a:p>
       </dsp:txBody>
       <dsp:txXfrm>
-        <a:off x="1003933" y="2214069"/>
-        <a:ext cx="2756250" cy="1893567"/>
+        <a:off x="1688893" y="1294485"/>
+        <a:ext cx="1634765" cy="2822221"/>
       </dsp:txXfrm>
     </dsp:sp>
     <dsp:sp modelId="{76CEE34D-7F35-429B-A6A4-01ED7646DB1D}">
@@ -5121,8 +5121,8 @@
       </dsp:nvSpPr>
       <dsp:spPr>
         <a:xfrm>
-          <a:off x="4779995" y="9069"/>
-          <a:ext cx="1681312" cy="1681312"/>
+          <a:off x="5122048" y="30501"/>
+          <a:ext cx="997207" cy="997207"/>
         </a:xfrm>
         <a:prstGeom prst="round2DiagRect">
           <a:avLst>
@@ -5164,8 +5164,8 @@
       </dsp:nvSpPr>
       <dsp:spPr>
         <a:xfrm>
-          <a:off x="5138308" y="367382"/>
-          <a:ext cx="964687" cy="964687"/>
+          <a:off x="5334568" y="243021"/>
+          <a:ext cx="572167" cy="572167"/>
         </a:xfrm>
         <a:prstGeom prst="rect">
           <a:avLst/>
@@ -5214,8 +5214,8 @@
       </dsp:nvSpPr>
       <dsp:spPr>
         <a:xfrm>
-          <a:off x="4242526" y="2214069"/>
-          <a:ext cx="2756250" cy="1893567"/>
+          <a:off x="4803269" y="1338314"/>
+          <a:ext cx="1634765" cy="2747890"/>
         </a:xfrm>
         <a:prstGeom prst="rect">
           <a:avLst/>
@@ -5302,13 +5302,13 @@
               <a:ea typeface="+mn-ea"/>
               <a:cs typeface="+mn-cs"/>
             </a:rPr>
-            <a:t>(meeting virtually and merging codes)</a:t>
+            <a:t>(meeting virtually; merging codes)</a:t>
           </a:r>
         </a:p>
       </dsp:txBody>
       <dsp:txXfrm>
-        <a:off x="4242526" y="2214069"/>
-        <a:ext cx="2756250" cy="1893567"/>
+        <a:off x="4803269" y="1338314"/>
+        <a:ext cx="1634765" cy="2747890"/>
       </dsp:txXfrm>
     </dsp:sp>
     <dsp:sp modelId="{26D84C9B-2A6D-497C-80A3-27B8C3430717}">
@@ -5318,8 +5318,8 @@
       </dsp:nvSpPr>
       <dsp:spPr>
         <a:xfrm>
-          <a:off x="8018589" y="9069"/>
-          <a:ext cx="1681312" cy="1681312"/>
+          <a:off x="8409689" y="47603"/>
+          <a:ext cx="997207" cy="997207"/>
         </a:xfrm>
         <a:prstGeom prst="round2DiagRect">
           <a:avLst>
@@ -5361,8 +5361,8 @@
       </dsp:nvSpPr>
       <dsp:spPr>
         <a:xfrm>
-          <a:off x="8376902" y="367382"/>
-          <a:ext cx="964687" cy="964687"/>
+          <a:off x="8631830" y="244325"/>
+          <a:ext cx="572167" cy="572167"/>
         </a:xfrm>
         <a:prstGeom prst="rect">
           <a:avLst/>
@@ -5411,8 +5411,8 @@
       </dsp:nvSpPr>
       <dsp:spPr>
         <a:xfrm>
-          <a:off x="7481120" y="2214069"/>
-          <a:ext cx="2756250" cy="1893567"/>
+          <a:off x="8090913" y="1299816"/>
+          <a:ext cx="1634765" cy="2747890"/>
         </a:xfrm>
         <a:prstGeom prst="rect">
           <a:avLst/>
@@ -5499,7 +5499,7 @@
               <a:ea typeface="+mn-ea"/>
               <a:cs typeface="+mn-cs"/>
             </a:rPr>
-            <a:t>(Knowing each other’s strengths and completing the project by our internal deadline)</a:t>
+            <a:t>(Knowing each other’s strengths; completing the project by our internal deadline; personal growth)</a:t>
           </a:r>
         </a:p>
         <a:p>
@@ -5520,8 +5520,8 @@
         </a:p>
       </dsp:txBody>
       <dsp:txXfrm>
-        <a:off x="7481120" y="2214069"/>
-        <a:ext cx="2756250" cy="1893567"/>
+        <a:off x="8090913" y="1299816"/>
+        <a:ext cx="1634765" cy="2747890"/>
       </dsp:txXfrm>
     </dsp:sp>
   </dsp:spTree>
@@ -11711,7 +11711,7 @@
           <a:p>
             <a:fld id="{DAE8B5A2-31CA-4BEB-9B7B-60EC87C4F1AE}" type="datetimeFigureOut">
               <a:rPr lang="en-US" smtClean="0"/>
-              <a:t>4/16/2020</a:t>
+              <a:t>4/18/2020</a:t>
             </a:fld>
             <a:endParaRPr lang="en-US"/>
           </a:p>
@@ -12108,7 +12108,16 @@
           <a:p>
             <a:r>
               <a:rPr lang="en-US" dirty="0"/>
-              <a:t>Opening the session for question and answers</a:t>
+              <a:t>Suraj</a:t>
+            </a:r>
+          </a:p>
+          <a:p>
+            <a:endParaRPr lang="en-US" dirty="0"/>
+          </a:p>
+          <a:p>
+            <a:r>
+              <a:rPr lang="en-US" dirty="0"/>
+              <a:t>Opening the session for feedback and question you might have</a:t>
             </a:r>
           </a:p>
         </p:txBody>
@@ -12193,6 +12202,10 @@
           <a:bodyPr/>
           <a:lstStyle/>
           <a:p>
+            <a:r>
+              <a:rPr lang="en-US"/>
+              <a:t>Deepali</a:t>
+            </a:r>
             <a:endParaRPr lang="en-US" dirty="0"/>
           </a:p>
         </p:txBody>
@@ -12277,7 +12290,10 @@
           <a:bodyPr/>
           <a:lstStyle/>
           <a:p>
-            <a:endParaRPr lang="en-US" dirty="0"/>
+            <a:r>
+              <a:rPr lang="en-US" dirty="0"/>
+              <a:t>Deepali</a:t>
+            </a:r>
           </a:p>
         </p:txBody>
       </p:sp>
@@ -12361,6 +12377,73 @@
           <a:bodyPr/>
           <a:lstStyle/>
           <a:p>
+            <a:pPr algn="l"/>
+            <a:r>
+              <a:rPr lang="en-US" sz="1200" u="none" dirty="0">
+                <a:solidFill>
+                  <a:srgbClr val="C00000"/>
+                </a:solidFill>
+              </a:rPr>
+              <a:t>Rich</a:t>
+            </a:r>
+          </a:p>
+          <a:p>
+            <a:pPr algn="l"/>
+            <a:endParaRPr lang="en-US" sz="1200" u="sng" dirty="0">
+              <a:solidFill>
+                <a:srgbClr val="C00000"/>
+              </a:solidFill>
+            </a:endParaRPr>
+          </a:p>
+          <a:p>
+            <a:pPr algn="l"/>
+            <a:r>
+              <a:rPr lang="en-US" sz="1200" u="sng" dirty="0">
+                <a:solidFill>
+                  <a:srgbClr val="C00000"/>
+                </a:solidFill>
+              </a:rPr>
+              <a:t>APIs used are </a:t>
+            </a:r>
+          </a:p>
+          <a:p>
+            <a:pPr lvl="0" algn="l">
+              <a:defRPr/>
+            </a:pPr>
+            <a:r>
+              <a:rPr lang="en-US" sz="1200" dirty="0">
+                <a:solidFill>
+                  <a:srgbClr val="C00000"/>
+                </a:solidFill>
+              </a:rPr>
+              <a:t>ticketmaster.com</a:t>
+            </a:r>
+          </a:p>
+          <a:p>
+            <a:pPr lvl="0" algn="l">
+              <a:defRPr/>
+            </a:pPr>
+            <a:r>
+              <a:rPr lang="en-US" sz="1200" dirty="0">
+                <a:solidFill>
+                  <a:srgbClr val="C00000"/>
+                </a:solidFill>
+              </a:rPr>
+              <a:t>bandsintown.com</a:t>
+            </a:r>
+          </a:p>
+          <a:p>
+            <a:pPr lvl="0" algn="l">
+              <a:defRPr/>
+            </a:pPr>
+            <a:r>
+              <a:rPr lang="en-US" sz="1200" dirty="0">
+                <a:solidFill>
+                  <a:srgbClr val="C00000"/>
+                </a:solidFill>
+              </a:rPr>
+              <a:t>openweathermap.com </a:t>
+            </a:r>
             <a:endParaRPr lang="en-US" dirty="0"/>
           </a:p>
         </p:txBody>
@@ -12444,6 +12527,20 @@
         <p:txBody>
           <a:bodyPr/>
           <a:lstStyle/>
+          <a:p>
+            <a:r>
+              <a:rPr lang="en-US" sz="1200" u="none" dirty="0">
+                <a:solidFill>
+                  <a:srgbClr val="C00000"/>
+                </a:solidFill>
+              </a:rPr>
+              <a:t>Rich</a:t>
+            </a:r>
+            <a:endParaRPr lang="en-US" dirty="0"/>
+          </a:p>
+          <a:p>
+            <a:endParaRPr lang="en-US" dirty="0"/>
+          </a:p>
           <a:p>
             <a:r>
               <a:rPr lang="en-US" dirty="0"/>
@@ -12532,7 +12629,10 @@
           <a:bodyPr/>
           <a:lstStyle/>
           <a:p>
-            <a:endParaRPr lang="en-US" dirty="0"/>
+            <a:r>
+              <a:rPr lang="en-US" dirty="0"/>
+              <a:t>Phillip</a:t>
+            </a:r>
           </a:p>
         </p:txBody>
       </p:sp>
@@ -12616,7 +12716,100 @@
           <a:bodyPr/>
           <a:lstStyle/>
           <a:p>
-            <a:endParaRPr lang="en-US" dirty="0"/>
+            <a:pPr marL="0" marR="0" lvl="0" indent="0" algn="l" defTabSz="914400" rtl="0" eaLnBrk="1" fontAlgn="auto" latinLnBrk="0" hangingPunct="1">
+              <a:lnSpc>
+                <a:spcPct val="100000"/>
+              </a:lnSpc>
+              <a:spcBef>
+                <a:spcPts val="0"/>
+              </a:spcBef>
+              <a:spcAft>
+                <a:spcPts val="0"/>
+              </a:spcAft>
+              <a:buClrTx/>
+              <a:buSzTx/>
+              <a:buFontTx/>
+              <a:buNone/>
+              <a:tabLst/>
+              <a:defRPr/>
+            </a:pPr>
+            <a:r>
+              <a:rPr lang="en-US" dirty="0"/>
+              <a:t>Phillip</a:t>
+            </a:r>
+          </a:p>
+          <a:p>
+            <a:pPr marL="0" marR="0" lvl="0" indent="0" algn="l" defTabSz="914400" rtl="0" eaLnBrk="1" fontAlgn="auto" latinLnBrk="0" hangingPunct="1">
+              <a:lnSpc>
+                <a:spcPct val="100000"/>
+              </a:lnSpc>
+              <a:spcBef>
+                <a:spcPts val="0"/>
+              </a:spcBef>
+              <a:spcAft>
+                <a:spcPts val="0"/>
+              </a:spcAft>
+              <a:buClrTx/>
+              <a:buSzTx/>
+              <a:buFontTx/>
+              <a:buNone/>
+              <a:tabLst/>
+              <a:defRPr/>
+            </a:pPr>
+            <a:endParaRPr lang="en-US" sz="1200" dirty="0">
+              <a:solidFill>
+                <a:srgbClr val="ED7D31"/>
+              </a:solidFill>
+              <a:hlinkClick r:id="rId3">
+                <a:extLst>
+                  <a:ext uri="{A12FA001-AC4F-418D-AE19-62706E023703}">
+                    <ahyp:hlinkClr xmlns:ahyp="http://schemas.microsoft.com/office/drawing/2018/hyperlinkcolor" val="tx"/>
+                  </a:ext>
+                </a:extLst>
+              </a:hlinkClick>
+            </a:endParaRPr>
+          </a:p>
+          <a:p>
+            <a:pPr marL="0" marR="0" lvl="0" indent="0" algn="l" defTabSz="914400" rtl="0" eaLnBrk="1" fontAlgn="auto" latinLnBrk="0" hangingPunct="1">
+              <a:lnSpc>
+                <a:spcPct val="100000"/>
+              </a:lnSpc>
+              <a:spcBef>
+                <a:spcPts val="0"/>
+              </a:spcBef>
+              <a:spcAft>
+                <a:spcPts val="0"/>
+              </a:spcAft>
+              <a:buClrTx/>
+              <a:buSzTx/>
+              <a:buFontTx/>
+              <a:buNone/>
+              <a:tabLst/>
+              <a:defRPr/>
+            </a:pPr>
+            <a:r>
+              <a:rPr lang="en-US" sz="1200" dirty="0">
+                <a:solidFill>
+                  <a:srgbClr val="ED7D31"/>
+                </a:solidFill>
+                <a:hlinkClick r:id="rId3">
+                  <a:extLst>
+                    <a:ext uri="{A12FA001-AC4F-418D-AE19-62706E023703}">
+                      <ahyp:hlinkClr xmlns:ahyp="http://schemas.microsoft.com/office/drawing/2018/hyperlinkcolor" val="tx"/>
+                    </a:ext>
+                  </a:extLst>
+                </a:hlinkClick>
+              </a:rPr>
+              <a:t>https://pmanapat.github.io/Music-VP/</a:t>
+            </a:r>
+            <a:r>
+              <a:rPr lang="en-US" sz="1200" dirty="0">
+                <a:solidFill>
+                  <a:srgbClr val="ED7D31"/>
+                </a:solidFill>
+              </a:rPr>
+              <a:t> </a:t>
+            </a:r>
           </a:p>
         </p:txBody>
       </p:sp>
@@ -12700,7 +12893,10 @@
           <a:bodyPr/>
           <a:lstStyle/>
           <a:p>
-            <a:endParaRPr lang="en-US" dirty="0"/>
+            <a:r>
+              <a:rPr lang="en-US" dirty="0"/>
+              <a:t>Suraj</a:t>
+            </a:r>
           </a:p>
         </p:txBody>
       </p:sp>
@@ -12784,7 +12980,10 @@
           <a:bodyPr/>
           <a:lstStyle/>
           <a:p>
-            <a:endParaRPr lang="en-US" dirty="0"/>
+            <a:r>
+              <a:rPr lang="en-US" dirty="0"/>
+              <a:t>Suraj</a:t>
+            </a:r>
           </a:p>
         </p:txBody>
       </p:sp>
@@ -12971,7 +13170,7 @@
           <a:p>
             <a:fld id="{57E63589-8CAE-426F-85A7-84747B9FAAA5}" type="datetimeFigureOut">
               <a:rPr lang="en-US" smtClean="0"/>
-              <a:t>4/16/2020</a:t>
+              <a:t>4/18/2020</a:t>
             </a:fld>
             <a:endParaRPr lang="en-US"/>
           </a:p>
@@ -13256,7 +13455,7 @@
           <a:p>
             <a:fld id="{57E63589-8CAE-426F-85A7-84747B9FAAA5}" type="datetimeFigureOut">
               <a:rPr lang="en-US" smtClean="0"/>
-              <a:t>4/16/2020</a:t>
+              <a:t>4/18/2020</a:t>
             </a:fld>
             <a:endParaRPr lang="en-US"/>
           </a:p>
@@ -13464,7 +13663,7 @@
           <a:p>
             <a:fld id="{57E63589-8CAE-426F-85A7-84747B9FAAA5}" type="datetimeFigureOut">
               <a:rPr lang="en-US" smtClean="0"/>
-              <a:t>4/16/2020</a:t>
+              <a:t>4/18/2020</a:t>
             </a:fld>
             <a:endParaRPr lang="en-US"/>
           </a:p>
@@ -13662,7 +13861,7 @@
           <a:p>
             <a:fld id="{57E63589-8CAE-426F-85A7-84747B9FAAA5}" type="datetimeFigureOut">
               <a:rPr lang="en-US" smtClean="0"/>
-              <a:t>4/16/2020</a:t>
+              <a:t>4/18/2020</a:t>
             </a:fld>
             <a:endParaRPr lang="en-US"/>
           </a:p>
@@ -13937,7 +14136,7 @@
           <a:p>
             <a:fld id="{57E63589-8CAE-426F-85A7-84747B9FAAA5}" type="datetimeFigureOut">
               <a:rPr lang="en-US" smtClean="0"/>
-              <a:t>4/16/2020</a:t>
+              <a:t>4/18/2020</a:t>
             </a:fld>
             <a:endParaRPr lang="en-US"/>
           </a:p>
@@ -14202,7 +14401,7 @@
           <a:p>
             <a:fld id="{57E63589-8CAE-426F-85A7-84747B9FAAA5}" type="datetimeFigureOut">
               <a:rPr lang="en-US" smtClean="0"/>
-              <a:t>4/16/2020</a:t>
+              <a:t>4/18/2020</a:t>
             </a:fld>
             <a:endParaRPr lang="en-US"/>
           </a:p>
@@ -14614,7 +14813,7 @@
           <a:p>
             <a:fld id="{57E63589-8CAE-426F-85A7-84747B9FAAA5}" type="datetimeFigureOut">
               <a:rPr lang="en-US" smtClean="0"/>
-              <a:t>4/16/2020</a:t>
+              <a:t>4/18/2020</a:t>
             </a:fld>
             <a:endParaRPr lang="en-US"/>
           </a:p>
@@ -14755,7 +14954,7 @@
           <a:p>
             <a:fld id="{57E63589-8CAE-426F-85A7-84747B9FAAA5}" type="datetimeFigureOut">
               <a:rPr lang="en-US" smtClean="0"/>
-              <a:t>4/16/2020</a:t>
+              <a:t>4/18/2020</a:t>
             </a:fld>
             <a:endParaRPr lang="en-US"/>
           </a:p>
@@ -14868,7 +15067,7 @@
           <a:p>
             <a:fld id="{57E63589-8CAE-426F-85A7-84747B9FAAA5}" type="datetimeFigureOut">
               <a:rPr lang="en-US" smtClean="0"/>
-              <a:t>4/16/2020</a:t>
+              <a:t>4/18/2020</a:t>
             </a:fld>
             <a:endParaRPr lang="en-US"/>
           </a:p>
@@ -15179,7 +15378,7 @@
           <a:p>
             <a:fld id="{57E63589-8CAE-426F-85A7-84747B9FAAA5}" type="datetimeFigureOut">
               <a:rPr lang="en-US" smtClean="0"/>
-              <a:t>4/16/2020</a:t>
+              <a:t>4/18/2020</a:t>
             </a:fld>
             <a:endParaRPr lang="en-US"/>
           </a:p>
@@ -15467,7 +15666,7 @@
           <a:p>
             <a:fld id="{57E63589-8CAE-426F-85A7-84747B9FAAA5}" type="datetimeFigureOut">
               <a:rPr lang="en-US" smtClean="0"/>
-              <a:t>4/16/2020</a:t>
+              <a:t>4/18/2020</a:t>
             </a:fld>
             <a:endParaRPr lang="en-US"/>
           </a:p>
@@ -15708,7 +15907,7 @@
           <a:p>
             <a:fld id="{57E63589-8CAE-426F-85A7-84747B9FAAA5}" type="datetimeFigureOut">
               <a:rPr lang="en-US" smtClean="0"/>
-              <a:t>4/16/2020</a:t>
+              <a:t>4/18/2020</a:t>
             </a:fld>
             <a:endParaRPr lang="en-US"/>
           </a:p>
@@ -17461,8 +17660,8 @@
         </p:nvSpPr>
         <p:spPr>
           <a:xfrm>
-            <a:off x="1" y="1788712"/>
-            <a:ext cx="12192000" cy="1015663"/>
+            <a:off x="1114926" y="2096720"/>
+            <a:ext cx="9962147" cy="1938992"/>
           </a:xfrm>
           <a:prstGeom prst="rect">
             <a:avLst/>
@@ -17501,6 +17700,25 @@
                 </a:solidFill>
               </a:rPr>
               <a:t>“Never before have I seen such a large group of people come together for something so important to them.”</a:t>
+            </a:r>
+          </a:p>
+          <a:p>
+            <a:pPr algn="ctr"/>
+            <a:endParaRPr lang="en-US" sz="2000" i="1" dirty="0">
+              <a:solidFill>
+                <a:schemeClr val="bg1"/>
+              </a:solidFill>
+            </a:endParaRPr>
+          </a:p>
+          <a:p>
+            <a:pPr algn="r"/>
+            <a:r>
+              <a:rPr lang="en-US" sz="2000" i="1" dirty="0">
+                <a:solidFill>
+                  <a:schemeClr val="bg1"/>
+                </a:solidFill>
+              </a:rPr>
+              <a:t>- Source is Internet</a:t>
             </a:r>
           </a:p>
         </p:txBody>
@@ -18740,7 +18958,7 @@
             <p:ph idx="1"/>
             <p:extLst>
               <p:ext uri="{D42A27DB-BD31-4B8C-83A1-F6EECF244321}">
-                <p14:modId xmlns:p14="http://schemas.microsoft.com/office/powerpoint/2010/main" val="2337813380"/>
+                <p14:modId xmlns:p14="http://schemas.microsoft.com/office/powerpoint/2010/main" val="542862005"/>
               </p:ext>
             </p:extLst>
           </p:nvPr>
@@ -18769,7 +18987,7 @@
         </p:nvSpPr>
         <p:spPr>
           <a:xfrm>
-            <a:off x="1600403" y="5400307"/>
+            <a:off x="1706281" y="5094216"/>
             <a:ext cx="2896447" cy="1323439"/>
           </a:xfrm>
           <a:prstGeom prst="rect">
@@ -21519,35 +21737,7 @@
                   <a:srgbClr val="950A14"/>
                 </a:solidFill>
               </a:rPr>
-              <a:t>Extend our services to tri-state</a:t>
-            </a:r>
-          </a:p>
-          <a:p>
-            <a:pPr marL="285750" indent="-285750" algn="ctr">
-              <a:spcAft>
-                <a:spcPts val="600"/>
-              </a:spcAft>
-              <a:buFont typeface="Arial" panose="020B0604020202020204" pitchFamily="34" charset="0"/>
-              <a:buChar char="•"/>
-            </a:pPr>
-            <a:r>
-              <a:rPr lang="en-US" sz="2000" kern="1200" dirty="0">
-                <a:solidFill>
-                  <a:srgbClr val="950A14"/>
-                </a:solidFill>
-                <a:latin typeface="+mj-lt"/>
-                <a:ea typeface="+mj-ea"/>
-                <a:cs typeface="+mj-cs"/>
-              </a:rPr>
-              <a:t>Direct the </a:t>
-            </a:r>
-            <a:r>
-              <a:rPr lang="en-US" sz="2000" dirty="0">
-                <a:solidFill>
-                  <a:srgbClr val="950A14"/>
-                </a:solidFill>
-              </a:rPr>
-              <a:t>Contact Us page to a database and store user information </a:t>
+              <a:t>Extend our services to outside of NY</a:t>
             </a:r>
           </a:p>
           <a:p>
@@ -21564,7 +21754,7 @@
                   <a:srgbClr val="950A14"/>
                 </a:solidFill>
               </a:rPr>
-              <a:t>Enhance the current features such as include advance search</a:t>
+              <a:t>Enhance the current features</a:t>
             </a:r>
           </a:p>
           <a:p>
@@ -22225,8 +22415,8 @@
           </p:blipFill>
           <p:spPr bwMode="auto">
             <a:xfrm>
-              <a:off x="7171591" y="1897669"/>
-              <a:ext cx="2143124" cy="2143126"/>
+              <a:off x="6921144" y="1849966"/>
+              <a:ext cx="2393571" cy="2393573"/>
             </a:xfrm>
             <a:prstGeom prst="rect">
               <a:avLst/>

</xml_diff>